<commit_message>
ppt felvitel & kliens profil adatok
</commit_message>
<xml_diff>
--- a/ShineGym&Fit edzésterv és étrendösszeállító webalkalmazás Szabó Richárd - Híves Sebastian.pptx
+++ b/ShineGym&Fit edzésterv és étrendösszeállító webalkalmazás Szabó Richárd - Híves Sebastian.pptx
@@ -10,10 +10,15 @@
     <p:sldId id="258" r:id="rId4"/>
     <p:sldId id="259" r:id="rId5"/>
     <p:sldId id="260" r:id="rId6"/>
-    <p:sldId id="261" r:id="rId7"/>
-    <p:sldId id="262" r:id="rId8"/>
-    <p:sldId id="264" r:id="rId9"/>
-    <p:sldId id="263" r:id="rId10"/>
+    <p:sldId id="268" r:id="rId7"/>
+    <p:sldId id="269" r:id="rId8"/>
+    <p:sldId id="261" r:id="rId9"/>
+    <p:sldId id="262" r:id="rId10"/>
+    <p:sldId id="265" r:id="rId11"/>
+    <p:sldId id="267" r:id="rId12"/>
+    <p:sldId id="266" r:id="rId13"/>
+    <p:sldId id="264" r:id="rId14"/>
+    <p:sldId id="263" r:id="rId15"/>
   </p:sldIdLst>
   <p:sldSz cx="12192000" cy="6858000"/>
   <p:notesSz cx="6858000" cy="9144000"/>
@@ -843,7 +848,7 @@
             <a:fld id="{B61BEF0D-F0BB-DE4B-95CE-6DB70DBA9567}" type="datetimeFigureOut">
               <a:rPr lang="en-US" dirty="0"/>
               <a:pPr/>
-              <a:t>4/12/2023</a:t>
+              <a:t>4/13/2023</a:t>
             </a:fld>
             <a:endParaRPr lang="en-US" dirty="0"/>
           </a:p>
@@ -1091,7 +1096,7 @@
             <a:fld id="{B61BEF0D-F0BB-DE4B-95CE-6DB70DBA9567}" type="datetimeFigureOut">
               <a:rPr lang="en-US" dirty="0"/>
               <a:pPr/>
-              <a:t>4/12/2023</a:t>
+              <a:t>4/13/2023</a:t>
             </a:fld>
             <a:endParaRPr lang="en-US" dirty="0"/>
           </a:p>
@@ -1402,7 +1407,7 @@
             <a:fld id="{B61BEF0D-F0BB-DE4B-95CE-6DB70DBA9567}" type="datetimeFigureOut">
               <a:rPr lang="en-US" dirty="0"/>
               <a:pPr/>
-              <a:t>4/12/2023</a:t>
+              <a:t>4/13/2023</a:t>
             </a:fld>
             <a:endParaRPr lang="en-US" dirty="0"/>
           </a:p>
@@ -1740,7 +1745,7 @@
             <a:fld id="{B61BEF0D-F0BB-DE4B-95CE-6DB70DBA9567}" type="datetimeFigureOut">
               <a:rPr lang="en-US" dirty="0"/>
               <a:pPr/>
-              <a:t>4/12/2023</a:t>
+              <a:t>4/13/2023</a:t>
             </a:fld>
             <a:endParaRPr lang="en-US" dirty="0"/>
           </a:p>
@@ -2051,7 +2056,7 @@
             <a:fld id="{B61BEF0D-F0BB-DE4B-95CE-6DB70DBA9567}" type="datetimeFigureOut">
               <a:rPr lang="en-US" dirty="0"/>
               <a:pPr/>
-              <a:t>4/12/2023</a:t>
+              <a:t>4/13/2023</a:t>
             </a:fld>
             <a:endParaRPr lang="en-US" dirty="0"/>
           </a:p>
@@ -2441,7 +2446,7 @@
             <a:fld id="{B61BEF0D-F0BB-DE4B-95CE-6DB70DBA9567}" type="datetimeFigureOut">
               <a:rPr lang="en-US" dirty="0"/>
               <a:pPr/>
-              <a:t>4/12/2023</a:t>
+              <a:t>4/13/2023</a:t>
             </a:fld>
             <a:endParaRPr lang="en-US" dirty="0"/>
           </a:p>
@@ -2607,7 +2612,7 @@
           <a:p>
             <a:fld id="{55C6B4A9-1611-4792-9094-5F34BCA07E0B}" type="datetimeFigureOut">
               <a:rPr lang="en-US" dirty="0"/>
-              <a:t>4/12/2023</a:t>
+              <a:t>4/13/2023</a:t>
             </a:fld>
             <a:endParaRPr lang="en-US" dirty="0"/>
           </a:p>
@@ -2783,7 +2788,7 @@
             <a:fld id="{B61BEF0D-F0BB-DE4B-95CE-6DB70DBA9567}" type="datetimeFigureOut">
               <a:rPr lang="en-US" dirty="0"/>
               <a:pPr/>
-              <a:t>4/12/2023</a:t>
+              <a:t>4/13/2023</a:t>
             </a:fld>
             <a:endParaRPr lang="en-US" dirty="0"/>
           </a:p>
@@ -2956,7 +2961,7 @@
             <a:fld id="{B61BEF0D-F0BB-DE4B-95CE-6DB70DBA9567}" type="datetimeFigureOut">
               <a:rPr lang="en-US" dirty="0"/>
               <a:pPr/>
-              <a:t>4/12/2023</a:t>
+              <a:t>4/13/2023</a:t>
             </a:fld>
             <a:endParaRPr lang="en-US" dirty="0"/>
           </a:p>
@@ -3200,7 +3205,7 @@
             <a:fld id="{B61BEF0D-F0BB-DE4B-95CE-6DB70DBA9567}" type="datetimeFigureOut">
               <a:rPr lang="en-US" dirty="0"/>
               <a:pPr/>
-              <a:t>4/12/2023</a:t>
+              <a:t>4/13/2023</a:t>
             </a:fld>
             <a:endParaRPr lang="en-US" dirty="0"/>
           </a:p>
@@ -3428,7 +3433,7 @@
           <a:p>
             <a:fld id="{EB712588-04B1-427B-82EE-E8DB90309F08}" type="datetimeFigureOut">
               <a:rPr lang="en-US" dirty="0"/>
-              <a:t>4/12/2023</a:t>
+              <a:t>4/13/2023</a:t>
             </a:fld>
             <a:endParaRPr lang="en-US" dirty="0"/>
           </a:p>
@@ -3798,7 +3803,7 @@
             <a:fld id="{B61BEF0D-F0BB-DE4B-95CE-6DB70DBA9567}" type="datetimeFigureOut">
               <a:rPr lang="en-US" dirty="0"/>
               <a:pPr/>
-              <a:t>4/12/2023</a:t>
+              <a:t>4/13/2023</a:t>
             </a:fld>
             <a:endParaRPr lang="en-US" dirty="0"/>
           </a:p>
@@ -3918,7 +3923,7 @@
             <a:fld id="{B61BEF0D-F0BB-DE4B-95CE-6DB70DBA9567}" type="datetimeFigureOut">
               <a:rPr lang="en-US" dirty="0"/>
               <a:pPr/>
-              <a:t>4/12/2023</a:t>
+              <a:t>4/13/2023</a:t>
             </a:fld>
             <a:endParaRPr lang="en-US" dirty="0"/>
           </a:p>
@@ -4010,7 +4015,7 @@
             <a:fld id="{B61BEF0D-F0BB-DE4B-95CE-6DB70DBA9567}" type="datetimeFigureOut">
               <a:rPr lang="en-US" dirty="0"/>
               <a:pPr/>
-              <a:t>4/12/2023</a:t>
+              <a:t>4/13/2023</a:t>
             </a:fld>
             <a:endParaRPr lang="en-US" dirty="0"/>
           </a:p>
@@ -4261,7 +4266,7 @@
           <a:p>
             <a:fld id="{42A54C80-263E-416B-A8E0-580EDEADCBDC}" type="datetimeFigureOut">
               <a:rPr lang="en-US" dirty="0"/>
-              <a:t>4/12/2023</a:t>
+              <a:t>4/13/2023</a:t>
             </a:fld>
             <a:endParaRPr lang="en-US" dirty="0"/>
           </a:p>
@@ -4520,7 +4525,7 @@
             <a:fld id="{B61BEF0D-F0BB-DE4B-95CE-6DB70DBA9567}" type="datetimeFigureOut">
               <a:rPr lang="en-US" dirty="0"/>
               <a:pPr/>
-              <a:t>4/12/2023</a:t>
+              <a:t>4/13/2023</a:t>
             </a:fld>
             <a:endParaRPr lang="en-US" dirty="0"/>
           </a:p>
@@ -5260,7 +5265,7 @@
             <a:fld id="{B61BEF0D-F0BB-DE4B-95CE-6DB70DBA9567}" type="datetimeFigureOut">
               <a:rPr lang="en-US" dirty="0"/>
               <a:pPr/>
-              <a:t>4/12/2023</a:t>
+              <a:t>4/13/2023</a:t>
             </a:fld>
             <a:endParaRPr lang="en-US" dirty="0"/>
           </a:p>
@@ -5861,6 +5866,407 @@
 </p:sld>
 </file>
 
+<file path=ppt/slides/slide10.xml><?xml version="1.0" encoding="utf-8"?>
+<p:sld xmlns:a="http://schemas.openxmlformats.org/drawingml/2006/main" xmlns:r="http://schemas.openxmlformats.org/officeDocument/2006/relationships" xmlns:p="http://schemas.openxmlformats.org/presentationml/2006/main">
+  <p:cSld>
+    <p:spTree>
+      <p:nvGrpSpPr>
+        <p:cNvPr id="1" name=""/>
+        <p:cNvGrpSpPr/>
+        <p:nvPr/>
+      </p:nvGrpSpPr>
+      <p:grpSpPr>
+        <a:xfrm>
+          <a:off x="0" y="0"/>
+          <a:ext cx="0" cy="0"/>
+          <a:chOff x="0" y="0"/>
+          <a:chExt cx="0" cy="0"/>
+        </a:xfrm>
+      </p:grpSpPr>
+      <p:sp>
+        <p:nvSpPr>
+          <p:cNvPr id="2" name="Cím 1"/>
+          <p:cNvSpPr>
+            <a:spLocks noGrp="1"/>
+          </p:cNvSpPr>
+          <p:nvPr>
+            <p:ph type="title"/>
+          </p:nvPr>
+        </p:nvSpPr>
+        <p:spPr>
+          <a:xfrm>
+            <a:off x="575981" y="243840"/>
+            <a:ext cx="8596668" cy="1320800"/>
+          </a:xfrm>
+        </p:spPr>
+        <p:txBody>
+          <a:bodyPr/>
+          <a:lstStyle/>
+          <a:p>
+            <a:r>
+              <a:rPr lang="hu-HU" dirty="0" smtClean="0"/>
+              <a:t>Új edzésterv felvétele</a:t>
+            </a:r>
+            <a:endParaRPr lang="hu-HU" dirty="0"/>
+          </a:p>
+        </p:txBody>
+      </p:sp>
+      <p:pic>
+        <p:nvPicPr>
+          <p:cNvPr id="8" name="Tartalom helye 7"/>
+          <p:cNvPicPr>
+            <a:picLocks noGrp="1" noChangeAspect="1"/>
+          </p:cNvPicPr>
+          <p:nvPr>
+            <p:ph idx="1"/>
+          </p:nvPr>
+        </p:nvPicPr>
+        <p:blipFill>
+          <a:blip r:embed="rId2">
+            <a:extLst>
+              <a:ext uri="{28A0092B-C50C-407E-A947-70E740481C1C}">
+                <a14:useLocalDpi xmlns:a14="http://schemas.microsoft.com/office/drawing/2010/main" val="0"/>
+              </a:ext>
+            </a:extLst>
+          </a:blip>
+          <a:stretch>
+            <a:fillRect/>
+          </a:stretch>
+        </p:blipFill>
+        <p:spPr>
+          <a:xfrm>
+            <a:off x="2427316" y="904240"/>
+            <a:ext cx="4696690" cy="5836616"/>
+          </a:xfrm>
+        </p:spPr>
+      </p:pic>
+    </p:spTree>
+    <p:extLst>
+      <p:ext uri="{BB962C8B-B14F-4D97-AF65-F5344CB8AC3E}">
+        <p14:creationId xmlns:p14="http://schemas.microsoft.com/office/powerpoint/2010/main" val="719022423"/>
+      </p:ext>
+    </p:extLst>
+  </p:cSld>
+  <p:clrMapOvr>
+    <a:masterClrMapping/>
+  </p:clrMapOvr>
+</p:sld>
+</file>
+
+<file path=ppt/slides/slide11.xml><?xml version="1.0" encoding="utf-8"?>
+<p:sld xmlns:a="http://schemas.openxmlformats.org/drawingml/2006/main" xmlns:r="http://schemas.openxmlformats.org/officeDocument/2006/relationships" xmlns:p="http://schemas.openxmlformats.org/presentationml/2006/main">
+  <p:cSld>
+    <p:spTree>
+      <p:nvGrpSpPr>
+        <p:cNvPr id="1" name=""/>
+        <p:cNvGrpSpPr/>
+        <p:nvPr/>
+      </p:nvGrpSpPr>
+      <p:grpSpPr>
+        <a:xfrm>
+          <a:off x="0" y="0"/>
+          <a:ext cx="0" cy="0"/>
+          <a:chOff x="0" y="0"/>
+          <a:chExt cx="0" cy="0"/>
+        </a:xfrm>
+      </p:grpSpPr>
+      <p:sp>
+        <p:nvSpPr>
+          <p:cNvPr id="2" name="Cím 1"/>
+          <p:cNvSpPr>
+            <a:spLocks noGrp="1"/>
+          </p:cNvSpPr>
+          <p:nvPr>
+            <p:ph type="title"/>
+          </p:nvPr>
+        </p:nvSpPr>
+        <p:spPr/>
+        <p:txBody>
+          <a:bodyPr/>
+          <a:lstStyle/>
+          <a:p>
+            <a:r>
+              <a:rPr lang="hu-HU" dirty="0" smtClean="0"/>
+              <a:t>A kliens edzésterve</a:t>
+            </a:r>
+            <a:endParaRPr lang="hu-HU" dirty="0"/>
+          </a:p>
+        </p:txBody>
+      </p:sp>
+      <p:pic>
+        <p:nvPicPr>
+          <p:cNvPr id="4" name="Tartalom helye 3"/>
+          <p:cNvPicPr>
+            <a:picLocks noGrp="1" noChangeAspect="1"/>
+          </p:cNvPicPr>
+          <p:nvPr>
+            <p:ph idx="1"/>
+          </p:nvPr>
+        </p:nvPicPr>
+        <p:blipFill>
+          <a:blip r:embed="rId2">
+            <a:extLst>
+              <a:ext uri="{28A0092B-C50C-407E-A947-70E740481C1C}">
+                <a14:useLocalDpi xmlns:a14="http://schemas.microsoft.com/office/drawing/2010/main" val="0"/>
+              </a:ext>
+            </a:extLst>
+          </a:blip>
+          <a:stretch>
+            <a:fillRect/>
+          </a:stretch>
+        </p:blipFill>
+        <p:spPr>
+          <a:xfrm>
+            <a:off x="1138202" y="1794828"/>
+            <a:ext cx="7674932" cy="3881437"/>
+          </a:xfrm>
+        </p:spPr>
+      </p:pic>
+    </p:spTree>
+    <p:extLst>
+      <p:ext uri="{BB962C8B-B14F-4D97-AF65-F5344CB8AC3E}">
+        <p14:creationId xmlns:p14="http://schemas.microsoft.com/office/powerpoint/2010/main" val="3230008405"/>
+      </p:ext>
+    </p:extLst>
+  </p:cSld>
+  <p:clrMapOvr>
+    <a:masterClrMapping/>
+  </p:clrMapOvr>
+</p:sld>
+</file>
+
+<file path=ppt/slides/slide12.xml><?xml version="1.0" encoding="utf-8"?>
+<p:sld xmlns:a="http://schemas.openxmlformats.org/drawingml/2006/main" xmlns:r="http://schemas.openxmlformats.org/officeDocument/2006/relationships" xmlns:p="http://schemas.openxmlformats.org/presentationml/2006/main">
+  <p:cSld>
+    <p:spTree>
+      <p:nvGrpSpPr>
+        <p:cNvPr id="1" name=""/>
+        <p:cNvGrpSpPr/>
+        <p:nvPr/>
+      </p:nvGrpSpPr>
+      <p:grpSpPr>
+        <a:xfrm>
+          <a:off x="0" y="0"/>
+          <a:ext cx="0" cy="0"/>
+          <a:chOff x="0" y="0"/>
+          <a:chExt cx="0" cy="0"/>
+        </a:xfrm>
+      </p:grpSpPr>
+      <p:sp>
+        <p:nvSpPr>
+          <p:cNvPr id="2" name="Cím 1"/>
+          <p:cNvSpPr>
+            <a:spLocks noGrp="1"/>
+          </p:cNvSpPr>
+          <p:nvPr>
+            <p:ph type="title"/>
+          </p:nvPr>
+        </p:nvSpPr>
+        <p:spPr/>
+        <p:txBody>
+          <a:bodyPr/>
+          <a:lstStyle/>
+          <a:p>
+            <a:endParaRPr lang="hu-HU"/>
+          </a:p>
+        </p:txBody>
+      </p:sp>
+      <p:sp>
+        <p:nvSpPr>
+          <p:cNvPr id="3" name="Tartalom helye 2"/>
+          <p:cNvSpPr>
+            <a:spLocks noGrp="1"/>
+          </p:cNvSpPr>
+          <p:nvPr>
+            <p:ph idx="1"/>
+          </p:nvPr>
+        </p:nvSpPr>
+        <p:spPr/>
+        <p:txBody>
+          <a:bodyPr/>
+          <a:lstStyle/>
+          <a:p>
+            <a:endParaRPr lang="hu-HU"/>
+          </a:p>
+        </p:txBody>
+      </p:sp>
+    </p:spTree>
+    <p:extLst>
+      <p:ext uri="{BB962C8B-B14F-4D97-AF65-F5344CB8AC3E}">
+        <p14:creationId xmlns:p14="http://schemas.microsoft.com/office/powerpoint/2010/main" val="2947586195"/>
+      </p:ext>
+    </p:extLst>
+  </p:cSld>
+  <p:clrMapOvr>
+    <a:masterClrMapping/>
+  </p:clrMapOvr>
+</p:sld>
+</file>
+
+<file path=ppt/slides/slide13.xml><?xml version="1.0" encoding="utf-8"?>
+<p:sld xmlns:a="http://schemas.openxmlformats.org/drawingml/2006/main" xmlns:r="http://schemas.openxmlformats.org/officeDocument/2006/relationships" xmlns:p="http://schemas.openxmlformats.org/presentationml/2006/main">
+  <p:cSld>
+    <p:spTree>
+      <p:nvGrpSpPr>
+        <p:cNvPr id="1" name=""/>
+        <p:cNvGrpSpPr/>
+        <p:nvPr/>
+      </p:nvGrpSpPr>
+      <p:grpSpPr>
+        <a:xfrm>
+          <a:off x="0" y="0"/>
+          <a:ext cx="0" cy="0"/>
+          <a:chOff x="0" y="0"/>
+          <a:chExt cx="0" cy="0"/>
+        </a:xfrm>
+      </p:grpSpPr>
+      <p:sp>
+        <p:nvSpPr>
+          <p:cNvPr id="2" name="Cím 1"/>
+          <p:cNvSpPr>
+            <a:spLocks noGrp="1"/>
+          </p:cNvSpPr>
+          <p:nvPr>
+            <p:ph type="title"/>
+          </p:nvPr>
+        </p:nvSpPr>
+        <p:spPr/>
+        <p:txBody>
+          <a:bodyPr/>
+          <a:lstStyle/>
+          <a:p>
+            <a:r>
+              <a:rPr lang="hu-HU" dirty="0" smtClean="0"/>
+              <a:t>Chat</a:t>
+            </a:r>
+            <a:endParaRPr lang="hu-HU" dirty="0"/>
+          </a:p>
+        </p:txBody>
+      </p:sp>
+      <p:pic>
+        <p:nvPicPr>
+          <p:cNvPr id="4" name="Tartalom helye 3"/>
+          <p:cNvPicPr>
+            <a:picLocks noGrp="1" noChangeAspect="1"/>
+          </p:cNvPicPr>
+          <p:nvPr>
+            <p:ph idx="1"/>
+          </p:nvPr>
+        </p:nvPicPr>
+        <p:blipFill>
+          <a:blip r:embed="rId2">
+            <a:extLst>
+              <a:ext uri="{28A0092B-C50C-407E-A947-70E740481C1C}">
+                <a14:useLocalDpi xmlns:a14="http://schemas.microsoft.com/office/drawing/2010/main" val="0"/>
+              </a:ext>
+            </a:extLst>
+          </a:blip>
+          <a:stretch>
+            <a:fillRect/>
+          </a:stretch>
+        </p:blipFill>
+        <p:spPr>
+          <a:xfrm>
+            <a:off x="1645749" y="1636887"/>
+            <a:ext cx="6659838" cy="3881437"/>
+          </a:xfrm>
+        </p:spPr>
+      </p:pic>
+    </p:spTree>
+    <p:extLst>
+      <p:ext uri="{BB962C8B-B14F-4D97-AF65-F5344CB8AC3E}">
+        <p14:creationId xmlns:p14="http://schemas.microsoft.com/office/powerpoint/2010/main" val="3545457215"/>
+      </p:ext>
+    </p:extLst>
+  </p:cSld>
+  <p:clrMapOvr>
+    <a:masterClrMapping/>
+  </p:clrMapOvr>
+</p:sld>
+</file>
+
+<file path=ppt/slides/slide14.xml><?xml version="1.0" encoding="utf-8"?>
+<p:sld xmlns:a="http://schemas.openxmlformats.org/drawingml/2006/main" xmlns:r="http://schemas.openxmlformats.org/officeDocument/2006/relationships" xmlns:p="http://schemas.openxmlformats.org/presentationml/2006/main">
+  <p:cSld>
+    <p:spTree>
+      <p:nvGrpSpPr>
+        <p:cNvPr id="1" name=""/>
+        <p:cNvGrpSpPr/>
+        <p:nvPr/>
+      </p:nvGrpSpPr>
+      <p:grpSpPr>
+        <a:xfrm>
+          <a:off x="0" y="0"/>
+          <a:ext cx="0" cy="0"/>
+          <a:chOff x="0" y="0"/>
+          <a:chExt cx="0" cy="0"/>
+        </a:xfrm>
+      </p:grpSpPr>
+      <p:sp>
+        <p:nvSpPr>
+          <p:cNvPr id="2" name="Cím 1"/>
+          <p:cNvSpPr>
+            <a:spLocks noGrp="1"/>
+          </p:cNvSpPr>
+          <p:nvPr>
+            <p:ph type="title"/>
+          </p:nvPr>
+        </p:nvSpPr>
+        <p:spPr/>
+        <p:txBody>
+          <a:bodyPr/>
+          <a:lstStyle/>
+          <a:p>
+            <a:r>
+              <a:rPr lang="hu-HU" dirty="0" smtClean="0"/>
+              <a:t>Kliensek/Edzők kezelése</a:t>
+            </a:r>
+            <a:endParaRPr lang="hu-HU" dirty="0"/>
+          </a:p>
+        </p:txBody>
+      </p:sp>
+      <p:pic>
+        <p:nvPicPr>
+          <p:cNvPr id="4" name="Tartalom helye 3"/>
+          <p:cNvPicPr>
+            <a:picLocks noGrp="1" noChangeAspect="1"/>
+          </p:cNvPicPr>
+          <p:nvPr>
+            <p:ph idx="1"/>
+          </p:nvPr>
+        </p:nvPicPr>
+        <p:blipFill>
+          <a:blip r:embed="rId2">
+            <a:extLst>
+              <a:ext uri="{28A0092B-C50C-407E-A947-70E740481C1C}">
+                <a14:useLocalDpi xmlns:a14="http://schemas.microsoft.com/office/drawing/2010/main" val="0"/>
+              </a:ext>
+            </a:extLst>
+          </a:blip>
+          <a:stretch>
+            <a:fillRect/>
+          </a:stretch>
+        </p:blipFill>
+        <p:spPr>
+          <a:xfrm>
+            <a:off x="1354502" y="1678450"/>
+            <a:ext cx="7242331" cy="3881437"/>
+          </a:xfrm>
+        </p:spPr>
+      </p:pic>
+    </p:spTree>
+    <p:extLst>
+      <p:ext uri="{BB962C8B-B14F-4D97-AF65-F5344CB8AC3E}">
+        <p14:creationId xmlns:p14="http://schemas.microsoft.com/office/powerpoint/2010/main" val="957547199"/>
+      </p:ext>
+    </p:extLst>
+  </p:cSld>
+  <p:clrMapOvr>
+    <a:masterClrMapping/>
+  </p:clrMapOvr>
+</p:sld>
+</file>
+
 <file path=ppt/slides/slide2.xml><?xml version="1.0" encoding="utf-8"?>
 <p:sld xmlns:a="http://schemas.openxmlformats.org/drawingml/2006/main" xmlns:r="http://schemas.openxmlformats.org/officeDocument/2006/relationships" xmlns:p="http://schemas.openxmlformats.org/presentationml/2006/main">
   <p:cSld>
@@ -6214,7 +6620,7 @@
           <a:p>
             <a:r>
               <a:rPr lang="hu-HU" dirty="0" smtClean="0"/>
-              <a:t>Kezdőlap</a:t>
+              <a:t>Saját profil adatai</a:t>
             </a:r>
             <a:endParaRPr lang="hu-HU" dirty="0"/>
           </a:p>
@@ -6222,7 +6628,7 @@
       </p:sp>
       <p:pic>
         <p:nvPicPr>
-          <p:cNvPr id="6" name="Tartalom helye 5"/>
+          <p:cNvPr id="4" name="Tartalom helye 3"/>
           <p:cNvPicPr>
             <a:picLocks noGrp="1" noChangeAspect="1"/>
           </p:cNvPicPr>
@@ -6244,7 +6650,7 @@
         </p:blipFill>
         <p:spPr>
           <a:xfrm>
-            <a:off x="1354502" y="1664393"/>
+            <a:off x="1354502" y="1711701"/>
             <a:ext cx="7242331" cy="3881437"/>
           </a:xfrm>
         </p:spPr>
@@ -6252,7 +6658,7 @@
     </p:spTree>
     <p:extLst>
       <p:ext uri="{BB962C8B-B14F-4D97-AF65-F5344CB8AC3E}">
-        <p14:creationId xmlns:p14="http://schemas.microsoft.com/office/powerpoint/2010/main" val="2790274322"/>
+        <p14:creationId xmlns:p14="http://schemas.microsoft.com/office/powerpoint/2010/main" val="4187611990"/>
       </p:ext>
     </p:extLst>
   </p:cSld>
@@ -6296,7 +6702,7 @@
           <a:p>
             <a:r>
               <a:rPr lang="hu-HU" dirty="0" smtClean="0"/>
-              <a:t>Edzéstervek</a:t>
+              <a:t>Edző/Kliens profil adatai</a:t>
             </a:r>
             <a:endParaRPr lang="hu-HU" dirty="0"/>
           </a:p>
@@ -6326,15 +6732,15 @@
         </p:blipFill>
         <p:spPr>
           <a:xfrm>
-            <a:off x="1354502" y="1686763"/>
-            <a:ext cx="7242331" cy="3881437"/>
+            <a:off x="1263534" y="1786515"/>
+            <a:ext cx="7549599" cy="3881437"/>
           </a:xfrm>
         </p:spPr>
       </p:pic>
     </p:spTree>
     <p:extLst>
       <p:ext uri="{BB962C8B-B14F-4D97-AF65-F5344CB8AC3E}">
-        <p14:creationId xmlns:p14="http://schemas.microsoft.com/office/powerpoint/2010/main" val="3600894654"/>
+        <p14:creationId xmlns:p14="http://schemas.microsoft.com/office/powerpoint/2010/main" val="1744131174"/>
       </p:ext>
     </p:extLst>
   </p:cSld>
@@ -6378,7 +6784,7 @@
           <a:p>
             <a:r>
               <a:rPr lang="hu-HU" dirty="0" smtClean="0"/>
-              <a:t>Chat</a:t>
+              <a:t>Kezdőlap</a:t>
             </a:r>
             <a:endParaRPr lang="hu-HU" dirty="0"/>
           </a:p>
@@ -6386,7 +6792,7 @@
       </p:sp>
       <p:pic>
         <p:nvPicPr>
-          <p:cNvPr id="4" name="Tartalom helye 3"/>
+          <p:cNvPr id="6" name="Tartalom helye 5"/>
           <p:cNvPicPr>
             <a:picLocks noGrp="1" noChangeAspect="1"/>
           </p:cNvPicPr>
@@ -6408,15 +6814,15 @@
         </p:blipFill>
         <p:spPr>
           <a:xfrm>
-            <a:off x="1645749" y="1636887"/>
-            <a:ext cx="6659838" cy="3881437"/>
+            <a:off x="1354502" y="1722582"/>
+            <a:ext cx="7242331" cy="3881437"/>
           </a:xfrm>
         </p:spPr>
       </p:pic>
     </p:spTree>
     <p:extLst>
       <p:ext uri="{BB962C8B-B14F-4D97-AF65-F5344CB8AC3E}">
-        <p14:creationId xmlns:p14="http://schemas.microsoft.com/office/powerpoint/2010/main" val="3545457215"/>
+        <p14:creationId xmlns:p14="http://schemas.microsoft.com/office/powerpoint/2010/main" val="2790274322"/>
       </p:ext>
     </p:extLst>
   </p:cSld>
@@ -6460,7 +6866,7 @@
           <a:p>
             <a:r>
               <a:rPr lang="hu-HU" dirty="0" smtClean="0"/>
-              <a:t>Kliensek/Edzők kezelése</a:t>
+              <a:t>Edzéstervek</a:t>
             </a:r>
             <a:endParaRPr lang="hu-HU" dirty="0"/>
           </a:p>
@@ -6490,7 +6896,7 @@
         </p:blipFill>
         <p:spPr>
           <a:xfrm>
-            <a:off x="1354502" y="1678450"/>
+            <a:off x="1354502" y="1686763"/>
             <a:ext cx="7242331" cy="3881437"/>
           </a:xfrm>
         </p:spPr>
@@ -6498,7 +6904,7 @@
     </p:spTree>
     <p:extLst>
       <p:ext uri="{BB962C8B-B14F-4D97-AF65-F5344CB8AC3E}">
-        <p14:creationId xmlns:p14="http://schemas.microsoft.com/office/powerpoint/2010/main" val="957547199"/>
+        <p14:creationId xmlns:p14="http://schemas.microsoft.com/office/powerpoint/2010/main" val="3600894654"/>
       </p:ext>
     </p:extLst>
   </p:cSld>

</xml_diff>

<commit_message>
pelda adatok, javitasok, kepek
</commit_message>
<xml_diff>
--- a/ShineGym&Fit edzésterv és étrendösszeállító webalkalmazás Szabó Richárd - Híves Sebastian.pptx
+++ b/ShineGym&Fit edzésterv és étrendösszeállító webalkalmazás Szabó Richárd - Híves Sebastian.pptx
@@ -846,7 +846,7 @@
             <a:fld id="{B61BEF0D-F0BB-DE4B-95CE-6DB70DBA9567}" type="datetimeFigureOut">
               <a:rPr lang="en-US" smtClean="0"/>
               <a:pPr/>
-              <a:t>4/14/2023</a:t>
+              <a:t>4/17/2023</a:t>
             </a:fld>
             <a:endParaRPr lang="en-US" dirty="0"/>
           </a:p>
@@ -1099,7 +1099,7 @@
             <a:fld id="{B61BEF0D-F0BB-DE4B-95CE-6DB70DBA9567}" type="datetimeFigureOut">
               <a:rPr lang="en-US" smtClean="0"/>
               <a:pPr/>
-              <a:t>4/14/2023</a:t>
+              <a:t>4/17/2023</a:t>
             </a:fld>
             <a:endParaRPr lang="en-US" dirty="0"/>
           </a:p>
@@ -1415,7 +1415,7 @@
             <a:fld id="{B61BEF0D-F0BB-DE4B-95CE-6DB70DBA9567}" type="datetimeFigureOut">
               <a:rPr lang="en-US" smtClean="0"/>
               <a:pPr/>
-              <a:t>4/14/2023</a:t>
+              <a:t>4/17/2023</a:t>
             </a:fld>
             <a:endParaRPr lang="en-US" dirty="0"/>
           </a:p>
@@ -1758,7 +1758,7 @@
             <a:fld id="{B61BEF0D-F0BB-DE4B-95CE-6DB70DBA9567}" type="datetimeFigureOut">
               <a:rPr lang="en-US" smtClean="0"/>
               <a:pPr/>
-              <a:t>4/14/2023</a:t>
+              <a:t>4/17/2023</a:t>
             </a:fld>
             <a:endParaRPr lang="en-US" dirty="0"/>
           </a:p>
@@ -2074,7 +2074,7 @@
             <a:fld id="{B61BEF0D-F0BB-DE4B-95CE-6DB70DBA9567}" type="datetimeFigureOut">
               <a:rPr lang="en-US" smtClean="0"/>
               <a:pPr/>
-              <a:t>4/14/2023</a:t>
+              <a:t>4/17/2023</a:t>
             </a:fld>
             <a:endParaRPr lang="en-US" dirty="0"/>
           </a:p>
@@ -2469,7 +2469,7 @@
             <a:fld id="{B61BEF0D-F0BB-DE4B-95CE-6DB70DBA9567}" type="datetimeFigureOut">
               <a:rPr lang="en-US" smtClean="0"/>
               <a:pPr/>
-              <a:t>4/14/2023</a:t>
+              <a:t>4/17/2023</a:t>
             </a:fld>
             <a:endParaRPr lang="en-US" dirty="0"/>
           </a:p>
@@ -2640,7 +2640,7 @@
           <a:p>
             <a:fld id="{55C6B4A9-1611-4792-9094-5F34BCA07E0B}" type="datetimeFigureOut">
               <a:rPr lang="en-US" smtClean="0"/>
-              <a:t>4/14/2023</a:t>
+              <a:t>4/17/2023</a:t>
             </a:fld>
             <a:endParaRPr lang="en-US" dirty="0"/>
           </a:p>
@@ -2821,7 +2821,7 @@
             <a:fld id="{B61BEF0D-F0BB-DE4B-95CE-6DB70DBA9567}" type="datetimeFigureOut">
               <a:rPr lang="en-US" smtClean="0"/>
               <a:pPr/>
-              <a:t>4/14/2023</a:t>
+              <a:t>4/17/2023</a:t>
             </a:fld>
             <a:endParaRPr lang="en-US" dirty="0"/>
           </a:p>
@@ -2999,7 +2999,7 @@
             <a:fld id="{B61BEF0D-F0BB-DE4B-95CE-6DB70DBA9567}" type="datetimeFigureOut">
               <a:rPr lang="en-US" smtClean="0"/>
               <a:pPr/>
-              <a:t>4/14/2023</a:t>
+              <a:t>4/17/2023</a:t>
             </a:fld>
             <a:endParaRPr lang="en-US" dirty="0"/>
           </a:p>
@@ -3248,7 +3248,7 @@
             <a:fld id="{B61BEF0D-F0BB-DE4B-95CE-6DB70DBA9567}" type="datetimeFigureOut">
               <a:rPr lang="en-US" smtClean="0"/>
               <a:pPr/>
-              <a:t>4/14/2023</a:t>
+              <a:t>4/17/2023</a:t>
             </a:fld>
             <a:endParaRPr lang="en-US" dirty="0"/>
           </a:p>
@@ -3481,7 +3481,7 @@
           <a:p>
             <a:fld id="{EB712588-04B1-427B-82EE-E8DB90309F08}" type="datetimeFigureOut">
               <a:rPr lang="en-US" smtClean="0"/>
-              <a:t>4/14/2023</a:t>
+              <a:t>4/17/2023</a:t>
             </a:fld>
             <a:endParaRPr lang="en-US" dirty="0"/>
           </a:p>
@@ -3856,7 +3856,7 @@
             <a:fld id="{B61BEF0D-F0BB-DE4B-95CE-6DB70DBA9567}" type="datetimeFigureOut">
               <a:rPr lang="en-US" smtClean="0"/>
               <a:pPr/>
-              <a:t>4/14/2023</a:t>
+              <a:t>4/17/2023</a:t>
             </a:fld>
             <a:endParaRPr lang="en-US" dirty="0"/>
           </a:p>
@@ -3981,7 +3981,7 @@
             <a:fld id="{B61BEF0D-F0BB-DE4B-95CE-6DB70DBA9567}" type="datetimeFigureOut">
               <a:rPr lang="en-US" smtClean="0"/>
               <a:pPr/>
-              <a:t>4/14/2023</a:t>
+              <a:t>4/17/2023</a:t>
             </a:fld>
             <a:endParaRPr lang="en-US" dirty="0"/>
           </a:p>
@@ -4078,7 +4078,7 @@
             <a:fld id="{B61BEF0D-F0BB-DE4B-95CE-6DB70DBA9567}" type="datetimeFigureOut">
               <a:rPr lang="en-US" smtClean="0"/>
               <a:pPr/>
-              <a:t>4/14/2023</a:t>
+              <a:t>4/17/2023</a:t>
             </a:fld>
             <a:endParaRPr lang="en-US" dirty="0"/>
           </a:p>
@@ -4334,7 +4334,7 @@
           <a:p>
             <a:fld id="{42A54C80-263E-416B-A8E0-580EDEADCBDC}" type="datetimeFigureOut">
               <a:rPr lang="en-US" smtClean="0"/>
-              <a:t>4/14/2023</a:t>
+              <a:t>4/17/2023</a:t>
             </a:fld>
             <a:endParaRPr lang="en-US" dirty="0"/>
           </a:p>
@@ -4598,7 +4598,7 @@
             <a:fld id="{B61BEF0D-F0BB-DE4B-95CE-6DB70DBA9567}" type="datetimeFigureOut">
               <a:rPr lang="en-US" smtClean="0"/>
               <a:pPr/>
-              <a:t>4/14/2023</a:t>
+              <a:t>4/17/2023</a:t>
             </a:fld>
             <a:endParaRPr lang="en-US" dirty="0"/>
           </a:p>
@@ -5343,7 +5343,7 @@
             <a:fld id="{B61BEF0D-F0BB-DE4B-95CE-6DB70DBA9567}" type="datetimeFigureOut">
               <a:rPr lang="en-US" smtClean="0"/>
               <a:pPr/>
-              <a:t>4/14/2023</a:t>
+              <a:t>4/17/2023</a:t>
             </a:fld>
             <a:endParaRPr lang="en-US" dirty="0"/>
           </a:p>
@@ -6089,31 +6089,26 @@
       </p:sp>
       <p:pic>
         <p:nvPicPr>
-          <p:cNvPr id="4" name="Tartalom helye 3"/>
+          <p:cNvPr id="5" name="Kép 4"/>
           <p:cNvPicPr>
-            <a:picLocks noGrp="1" noChangeAspect="1"/>
+            <a:picLocks noChangeAspect="1"/>
           </p:cNvPicPr>
-          <p:nvPr>
-            <p:ph idx="1"/>
-          </p:nvPr>
+          <p:nvPr/>
         </p:nvPicPr>
         <p:blipFill>
-          <a:blip r:embed="rId2">
-            <a:extLst>
-              <a:ext uri="{28A0092B-C50C-407E-A947-70E740481C1C}">
-                <a14:useLocalDpi xmlns:a14="http://schemas.microsoft.com/office/drawing/2010/main" val="0"/>
-              </a:ext>
-            </a:extLst>
-          </a:blip>
+          <a:blip r:embed="rId2"/>
           <a:stretch>
             <a:fillRect/>
           </a:stretch>
         </p:blipFill>
         <p:spPr>
           <a:xfrm>
-            <a:off x="677334" y="1398067"/>
-            <a:ext cx="8322287" cy="4850333"/>
+            <a:off x="677334" y="1270001"/>
+            <a:ext cx="9663699" cy="4864616"/>
           </a:xfrm>
+          <a:prstGeom prst="rect">
+            <a:avLst/>
+          </a:prstGeom>
           <a:ln>
             <a:noFill/>
           </a:ln>
@@ -6464,53 +6459,32 @@
       </p:sp>
       <p:pic>
         <p:nvPicPr>
-          <p:cNvPr id="5" name="Kép 4">
-            <a:extLst>
-              <a:ext uri="{FF2B5EF4-FFF2-40B4-BE49-F238E27FC236}">
-                <a16:creationId xmlns:a16="http://schemas.microsoft.com/office/drawing/2014/main" id="{7256658E-109C-B003-A852-61549DE26624}"/>
-              </a:ext>
-            </a:extLst>
-          </p:cNvPr>
+          <p:cNvPr id="3" name="Kép 2"/>
           <p:cNvPicPr>
             <a:picLocks noChangeAspect="1"/>
           </p:cNvPicPr>
           <p:nvPr/>
         </p:nvPicPr>
-        <p:blipFill>
+        <p:blipFill rotWithShape="1">
           <a:blip r:embed="rId2"/>
-          <a:stretch>
-            <a:fillRect/>
-          </a:stretch>
+          <a:srcRect r="327"/>
+          <a:stretch/>
         </p:blipFill>
         <p:spPr>
           <a:xfrm>
-            <a:off x="677334" y="1368100"/>
-            <a:ext cx="9421540" cy="5144218"/>
+            <a:off x="677335" y="1354667"/>
+            <a:ext cx="9422630" cy="5055142"/>
           </a:xfrm>
           <a:prstGeom prst="rect">
             <a:avLst/>
           </a:prstGeom>
-          <a:ln>
-            <a:noFill/>
-          </a:ln>
           <a:effectLst>
-            <a:outerShdw blurRad="149987" dist="250190" dir="8460000" algn="ctr">
-              <a:srgbClr val="000000">
-                <a:alpha val="28000"/>
-              </a:srgbClr>
+            <a:outerShdw blurRad="50800" dist="38100" dir="5400000" algn="t" rotWithShape="0">
+              <a:prstClr val="black">
+                <a:alpha val="40000"/>
+              </a:prstClr>
             </a:outerShdw>
           </a:effectLst>
-          <a:scene3d>
-            <a:camera prst="orthographicFront">
-              <a:rot lat="0" lon="0" rev="0"/>
-            </a:camera>
-            <a:lightRig rig="contrasting" dir="t">
-              <a:rot lat="0" lon="0" rev="1500000"/>
-            </a:lightRig>
-          </a:scene3d>
-          <a:sp3d prstMaterial="metal">
-            <a:bevelT w="88900" h="88900"/>
-          </a:sp3d>
         </p:spPr>
       </p:pic>
     </p:spTree>
@@ -6677,13 +6651,7 @@
       </p:sp>
       <p:pic>
         <p:nvPicPr>
-          <p:cNvPr id="7" name="Kép 6">
-            <a:extLst>
-              <a:ext uri="{FF2B5EF4-FFF2-40B4-BE49-F238E27FC236}">
-                <a16:creationId xmlns:a16="http://schemas.microsoft.com/office/drawing/2014/main" id="{A5345A9A-133E-E292-C7FE-6EC8148D809F}"/>
-              </a:ext>
-            </a:extLst>
-          </p:cNvPr>
+          <p:cNvPr id="3" name="Kép 2"/>
           <p:cNvPicPr>
             <a:picLocks noChangeAspect="1"/>
           </p:cNvPicPr>
@@ -6697,33 +6665,19 @@
         </p:blipFill>
         <p:spPr>
           <a:xfrm>
-            <a:off x="677333" y="1494133"/>
-            <a:ext cx="8932685" cy="4654004"/>
+            <a:off x="677333" y="1379913"/>
+            <a:ext cx="9090121" cy="4561640"/>
           </a:xfrm>
           <a:prstGeom prst="rect">
             <a:avLst/>
           </a:prstGeom>
-          <a:ln>
-            <a:noFill/>
-          </a:ln>
           <a:effectLst>
-            <a:outerShdw blurRad="190500" dist="228600" dir="2700000" algn="ctr">
-              <a:srgbClr val="000000">
-                <a:alpha val="30000"/>
-              </a:srgbClr>
+            <a:outerShdw blurRad="50800" dist="38100" dir="2700000" algn="tl" rotWithShape="0">
+              <a:prstClr val="black">
+                <a:alpha val="40000"/>
+              </a:prstClr>
             </a:outerShdw>
           </a:effectLst>
-          <a:scene3d>
-            <a:camera prst="orthographicFront">
-              <a:rot lat="0" lon="0" rev="0"/>
-            </a:camera>
-            <a:lightRig rig="glow" dir="t">
-              <a:rot lat="0" lon="0" rev="4800000"/>
-            </a:lightRig>
-          </a:scene3d>
-          <a:sp3d prstMaterial="matte">
-            <a:bevelT w="127000" h="63500"/>
-          </a:sp3d>
         </p:spPr>
       </p:pic>
     </p:spTree>
@@ -6790,13 +6744,7 @@
       </p:sp>
       <p:pic>
         <p:nvPicPr>
-          <p:cNvPr id="5" name="Kép 4">
-            <a:extLst>
-              <a:ext uri="{FF2B5EF4-FFF2-40B4-BE49-F238E27FC236}">
-                <a16:creationId xmlns:a16="http://schemas.microsoft.com/office/drawing/2014/main" id="{AAC22452-C37C-B230-DD8C-230D0383A342}"/>
-              </a:ext>
-            </a:extLst>
-          </p:cNvPr>
+          <p:cNvPr id="3" name="Kép 2"/>
           <p:cNvPicPr>
             <a:picLocks noChangeAspect="1"/>
           </p:cNvPicPr>
@@ -6810,8 +6758,8 @@
         </p:blipFill>
         <p:spPr>
           <a:xfrm>
-            <a:off x="677334" y="1409881"/>
-            <a:ext cx="8875461" cy="4365278"/>
+            <a:off x="677334" y="1424377"/>
+            <a:ext cx="9135708" cy="4594038"/>
           </a:xfrm>
           <a:prstGeom prst="rect">
             <a:avLst/>
@@ -6917,7 +6865,7 @@
         </p:blipFill>
         <p:spPr>
           <a:xfrm>
-            <a:off x="3830054" y="3982846"/>
+            <a:off x="3830054" y="4149101"/>
             <a:ext cx="7833965" cy="2619855"/>
           </a:xfrm>
           <a:prstGeom prst="rect">
@@ -6927,8 +6875,10 @@
             <a:noFill/>
           </a:ln>
           <a:effectLst>
-            <a:outerShdw blurRad="107950" dist="12700" dir="5400000" algn="ctr">
-              <a:srgbClr val="000000"/>
+            <a:outerShdw blurRad="50800" dist="38100" dir="5400000" algn="t" rotWithShape="0">
+              <a:prstClr val="black">
+                <a:alpha val="40000"/>
+              </a:prstClr>
             </a:outerShdw>
           </a:effectLst>
           <a:scene3d>
@@ -6940,7 +6890,6 @@
             </a:lightRig>
           </a:scene3d>
           <a:sp3d contourW="44450" prstMaterial="matte">
-            <a:bevelT w="63500" h="63500" prst="artDeco"/>
             <a:contourClr>
               <a:srgbClr val="FFFFFF"/>
             </a:contourClr>
@@ -7009,6 +6958,27 @@
           <a:prstGeom prst="rect">
             <a:avLst/>
           </a:prstGeom>
+          <a:ln>
+            <a:noFill/>
+          </a:ln>
+          <a:effectLst>
+            <a:outerShdw blurRad="190500" dist="228600" dir="2700000" algn="ctr">
+              <a:srgbClr val="000000">
+                <a:alpha val="30000"/>
+              </a:srgbClr>
+            </a:outerShdw>
+          </a:effectLst>
+          <a:scene3d>
+            <a:camera prst="orthographicFront">
+              <a:rot lat="0" lon="0" rev="0"/>
+            </a:camera>
+            <a:lightRig rig="glow" dir="t">
+              <a:rot lat="0" lon="0" rev="4800000"/>
+            </a:lightRig>
+          </a:scene3d>
+          <a:sp3d prstMaterial="matte">
+            <a:bevelT w="127000" h="63500"/>
+          </a:sp3d>
         </p:spPr>
       </p:pic>
       <p:sp>
@@ -7216,13 +7186,7 @@
       </p:sp>
       <p:pic>
         <p:nvPicPr>
-          <p:cNvPr id="6" name="Kép 5">
-            <a:extLst>
-              <a:ext uri="{FF2B5EF4-FFF2-40B4-BE49-F238E27FC236}">
-                <a16:creationId xmlns:a16="http://schemas.microsoft.com/office/drawing/2014/main" id="{EF9B27E2-7D9B-991B-5351-3AC7371AE542}"/>
-              </a:ext>
-            </a:extLst>
-          </p:cNvPr>
+          <p:cNvPr id="4" name="Kép 3"/>
           <p:cNvPicPr>
             <a:picLocks noChangeAspect="1"/>
           </p:cNvPicPr>
@@ -7236,44 +7200,17 @@
         </p:blipFill>
         <p:spPr>
           <a:xfrm>
-            <a:off x="455666" y="1287570"/>
-            <a:ext cx="6522651" cy="4379305"/>
+            <a:off x="575981" y="1064028"/>
+            <a:ext cx="5863685" cy="5301749"/>
           </a:xfrm>
           <a:prstGeom prst="rect">
             <a:avLst/>
           </a:prstGeom>
-          <a:ln>
-            <a:noFill/>
-          </a:ln>
-          <a:effectLst>
-            <a:outerShdw blurRad="190500" dist="228600" dir="2700000" algn="ctr">
-              <a:srgbClr val="000000">
-                <a:alpha val="30000"/>
-              </a:srgbClr>
-            </a:outerShdw>
-          </a:effectLst>
-          <a:scene3d>
-            <a:camera prst="orthographicFront">
-              <a:rot lat="0" lon="0" rev="0"/>
-            </a:camera>
-            <a:lightRig rig="glow" dir="t">
-              <a:rot lat="0" lon="0" rev="4800000"/>
-            </a:lightRig>
-          </a:scene3d>
-          <a:sp3d prstMaterial="matte">
-            <a:bevelT w="127000" h="63500"/>
-          </a:sp3d>
         </p:spPr>
       </p:pic>
       <p:pic>
         <p:nvPicPr>
-          <p:cNvPr id="11" name="Kép 10">
-            <a:extLst>
-              <a:ext uri="{FF2B5EF4-FFF2-40B4-BE49-F238E27FC236}">
-                <a16:creationId xmlns:a16="http://schemas.microsoft.com/office/drawing/2014/main" id="{C929F5D1-26DC-20CD-507D-BAA9D147B010}"/>
-              </a:ext>
-            </a:extLst>
-          </p:cNvPr>
+          <p:cNvPr id="5" name="Kép 4"/>
           <p:cNvPicPr>
             <a:picLocks noChangeAspect="1"/>
           </p:cNvPicPr>
@@ -7287,14 +7224,14 @@
         </p:blipFill>
         <p:spPr>
           <a:xfrm>
-            <a:off x="7098632" y="1197111"/>
-            <a:ext cx="4727877" cy="4560221"/>
+            <a:off x="7007670" y="1064028"/>
+            <a:ext cx="4329957" cy="5301749"/>
           </a:xfrm>
           <a:prstGeom prst="rect">
             <a:avLst/>
           </a:prstGeom>
           <a:effectLst>
-            <a:softEdge rad="127000"/>
+            <a:softEdge rad="165100"/>
           </a:effectLst>
         </p:spPr>
       </p:pic>

</xml_diff>